<commit_message>
Template Update - Add solid title
</commit_message>
<xml_diff>
--- a/Master Slides/70-535-00-Template.pptx
+++ b/Master Slides/70-535-00-Template.pptx
@@ -5,66 +5,67 @@
     <p:sldMasterId id="2147483660" r:id="rId1"/>
   </p:sldMasterIdLst>
   <p:notesMasterIdLst>
-    <p:notesMasterId r:id="rId20"/>
+    <p:notesMasterId r:id="rId21"/>
   </p:notesMasterIdLst>
   <p:handoutMasterIdLst>
-    <p:handoutMasterId r:id="rId21"/>
+    <p:handoutMasterId r:id="rId22"/>
   </p:handoutMasterIdLst>
   <p:sldIdLst>
     <p:sldId id="337" r:id="rId2"/>
-    <p:sldId id="311" r:id="rId3"/>
-    <p:sldId id="312" r:id="rId4"/>
-    <p:sldId id="313" r:id="rId5"/>
-    <p:sldId id="331" r:id="rId6"/>
-    <p:sldId id="315" r:id="rId7"/>
-    <p:sldId id="332" r:id="rId8"/>
-    <p:sldId id="316" r:id="rId9"/>
-    <p:sldId id="333" r:id="rId10"/>
-    <p:sldId id="318" r:id="rId11"/>
-    <p:sldId id="334" r:id="rId12"/>
-    <p:sldId id="323" r:id="rId13"/>
-    <p:sldId id="335" r:id="rId14"/>
-    <p:sldId id="329" r:id="rId15"/>
-    <p:sldId id="328" r:id="rId16"/>
-    <p:sldId id="327" r:id="rId17"/>
-    <p:sldId id="330" r:id="rId18"/>
-    <p:sldId id="336" r:id="rId19"/>
+    <p:sldId id="338" r:id="rId3"/>
+    <p:sldId id="311" r:id="rId4"/>
+    <p:sldId id="312" r:id="rId5"/>
+    <p:sldId id="313" r:id="rId6"/>
+    <p:sldId id="331" r:id="rId7"/>
+    <p:sldId id="315" r:id="rId8"/>
+    <p:sldId id="332" r:id="rId9"/>
+    <p:sldId id="316" r:id="rId10"/>
+    <p:sldId id="333" r:id="rId11"/>
+    <p:sldId id="318" r:id="rId12"/>
+    <p:sldId id="334" r:id="rId13"/>
+    <p:sldId id="323" r:id="rId14"/>
+    <p:sldId id="335" r:id="rId15"/>
+    <p:sldId id="329" r:id="rId16"/>
+    <p:sldId id="328" r:id="rId17"/>
+    <p:sldId id="327" r:id="rId18"/>
+    <p:sldId id="330" r:id="rId19"/>
+    <p:sldId id="336" r:id="rId20"/>
   </p:sldIdLst>
   <p:sldSz cx="9144000" cy="6858000" type="screen4x3"/>
   <p:notesSz cx="6858000" cy="9144000"/>
   <p:embeddedFontLst>
     <p:embeddedFont>
+      <p:font typeface="Verdana" panose="020B0604030504040204" pitchFamily="34" charset="0"/>
+      <p:regular r:id="rId23"/>
+      <p:bold r:id="rId24"/>
+      <p:italic r:id="rId25"/>
+      <p:boldItalic r:id="rId26"/>
+    </p:embeddedFont>
+    <p:embeddedFont>
+      <p:font typeface="Segoe UI Light" panose="020B0502040204020203" pitchFamily="34" charset="0"/>
+      <p:regular r:id="rId27"/>
+      <p:italic r:id="rId28"/>
+    </p:embeddedFont>
+    <p:embeddedFont>
       <p:font typeface="Calibri" panose="020F0502020204030204" pitchFamily="34" charset="0"/>
-      <p:regular r:id="rId22"/>
-      <p:bold r:id="rId23"/>
-      <p:italic r:id="rId24"/>
-      <p:boldItalic r:id="rId25"/>
+      <p:regular r:id="rId29"/>
+      <p:bold r:id="rId30"/>
+      <p:italic r:id="rId31"/>
+      <p:boldItalic r:id="rId32"/>
     </p:embeddedFont>
     <p:embeddedFont>
       <p:font typeface="Consolas" panose="020B0609020204030204" pitchFamily="49" charset="0"/>
-      <p:regular r:id="rId26"/>
-      <p:bold r:id="rId27"/>
-      <p:italic r:id="rId28"/>
-      <p:boldItalic r:id="rId29"/>
+      <p:regular r:id="rId33"/>
+      <p:bold r:id="rId34"/>
+      <p:italic r:id="rId35"/>
+      <p:boldItalic r:id="rId36"/>
     </p:embeddedFont>
     <p:embeddedFont>
       <p:font typeface="Segoe UI" panose="020B0502040204020203" pitchFamily="34" charset="0"/>
-      <p:regular r:id="rId30"/>
-      <p:bold r:id="rId31"/>
-      <p:italic r:id="rId32"/>
-      <p:boldItalic r:id="rId33"/>
-    </p:embeddedFont>
-    <p:embeddedFont>
-      <p:font typeface="Verdana" panose="020B0604030504040204" pitchFamily="34" charset="0"/>
-      <p:regular r:id="rId34"/>
-      <p:bold r:id="rId35"/>
-      <p:italic r:id="rId36"/>
-      <p:boldItalic r:id="rId37"/>
-    </p:embeddedFont>
-    <p:embeddedFont>
-      <p:font typeface="Segoe UI Light" panose="020B0502040204020203" pitchFamily="34" charset="0"/>
-      <p:regular r:id="rId38"/>
+      <p:regular r:id="rId37"/>
+      <p:bold r:id="rId38"/>
       <p:italic r:id="rId39"/>
+      <p:boldItalic r:id="rId40"/>
     </p:embeddedFont>
   </p:embeddedFontLst>
   <p:defaultTextStyle>
@@ -198,6 +199,7 @@
         <p14:section name="Default Section" id="{6D02174B-784A-434E-834A-4FC2579EC5AD}">
           <p14:sldIdLst>
             <p14:sldId id="337"/>
+            <p14:sldId id="338"/>
           </p14:sldIdLst>
         </p14:section>
         <p14:section name="Compute" id="{EE7F45B0-A6AD-411D-A512-DBBFEC401377}">
@@ -1605,7 +1607,7 @@
           <a:p>
             <a:fld id="{F19E9337-0361-41F3-9C17-1F4FFD1214BA}" type="slidenum">
               <a:rPr lang="en-US" smtClean="0"/>
-              <a:t>15</a:t>
+              <a:t>16</a:t>
             </a:fld>
             <a:endParaRPr lang="en-US" dirty="0"/>
           </a:p>
@@ -1694,7 +1696,7 @@
           <a:p>
             <a:fld id="{F19E9337-0361-41F3-9C17-1F4FFD1214BA}" type="slidenum">
               <a:rPr lang="en-US" smtClean="0"/>
-              <a:t>16</a:t>
+              <a:t>17</a:t>
             </a:fld>
             <a:endParaRPr lang="en-US" dirty="0"/>
           </a:p>
@@ -1783,7 +1785,7 @@
           <a:p>
             <a:fld id="{F19E9337-0361-41F3-9C17-1F4FFD1214BA}" type="slidenum">
               <a:rPr lang="en-US" smtClean="0"/>
-              <a:t>17</a:t>
+              <a:t>18</a:t>
             </a:fld>
             <a:endParaRPr lang="en-US" dirty="0"/>
           </a:p>
@@ -1872,7 +1874,7 @@
           <a:p>
             <a:fld id="{F19E9337-0361-41F3-9C17-1F4FFD1214BA}" type="slidenum">
               <a:rPr lang="en-US" smtClean="0"/>
-              <a:t>2</a:t>
+              <a:t>3</a:t>
             </a:fld>
             <a:endParaRPr lang="en-US" dirty="0"/>
           </a:p>
@@ -1961,7 +1963,7 @@
           <a:p>
             <a:fld id="{F19E9337-0361-41F3-9C17-1F4FFD1214BA}" type="slidenum">
               <a:rPr lang="en-US" smtClean="0"/>
-              <a:t>3</a:t>
+              <a:t>4</a:t>
             </a:fld>
             <a:endParaRPr lang="en-US" dirty="0"/>
           </a:p>
@@ -2050,7 +2052,7 @@
           <a:p>
             <a:fld id="{F19E9337-0361-41F3-9C17-1F4FFD1214BA}" type="slidenum">
               <a:rPr lang="en-US" smtClean="0"/>
-              <a:t>4</a:t>
+              <a:t>5</a:t>
             </a:fld>
             <a:endParaRPr lang="en-US" dirty="0"/>
           </a:p>
@@ -2139,7 +2141,7 @@
           <a:p>
             <a:fld id="{F19E9337-0361-41F3-9C17-1F4FFD1214BA}" type="slidenum">
               <a:rPr lang="en-US" smtClean="0"/>
-              <a:t>6</a:t>
+              <a:t>7</a:t>
             </a:fld>
             <a:endParaRPr lang="en-US" dirty="0"/>
           </a:p>
@@ -2228,7 +2230,7 @@
           <a:p>
             <a:fld id="{F19E9337-0361-41F3-9C17-1F4FFD1214BA}" type="slidenum">
               <a:rPr lang="en-US" smtClean="0"/>
-              <a:t>8</a:t>
+              <a:t>9</a:t>
             </a:fld>
             <a:endParaRPr lang="en-US" dirty="0"/>
           </a:p>
@@ -2317,7 +2319,7 @@
           <a:p>
             <a:fld id="{F19E9337-0361-41F3-9C17-1F4FFD1214BA}" type="slidenum">
               <a:rPr lang="en-US" smtClean="0"/>
-              <a:t>10</a:t>
+              <a:t>11</a:t>
             </a:fld>
             <a:endParaRPr lang="en-US" dirty="0"/>
           </a:p>
@@ -2406,7 +2408,7 @@
           <a:p>
             <a:fld id="{F19E9337-0361-41F3-9C17-1F4FFD1214BA}" type="slidenum">
               <a:rPr lang="en-US" smtClean="0"/>
-              <a:t>12</a:t>
+              <a:t>13</a:t>
             </a:fld>
             <a:endParaRPr lang="en-US" dirty="0"/>
           </a:p>
@@ -2495,7 +2497,7 @@
           <a:p>
             <a:fld id="{F19E9337-0361-41F3-9C17-1F4FFD1214BA}" type="slidenum">
               <a:rPr lang="en-US" smtClean="0"/>
-              <a:t>14</a:t>
+              <a:t>15</a:t>
             </a:fld>
             <a:endParaRPr lang="en-US" dirty="0"/>
           </a:p>
@@ -14284,6 +14286,192 @@
 </file>
 
 <file path=ppt/slides/slide10.xml><?xml version="1.0" encoding="utf-8"?>
+<p:sld xmlns:a="http://schemas.openxmlformats.org/drawingml/2006/main" xmlns:r="http://schemas.openxmlformats.org/officeDocument/2006/relationships" xmlns:p="http://schemas.openxmlformats.org/presentationml/2006/main" show="0">
+  <p:cSld>
+    <p:spTree>
+      <p:nvGrpSpPr>
+        <p:cNvPr id="1" name=""/>
+        <p:cNvGrpSpPr/>
+        <p:nvPr/>
+      </p:nvGrpSpPr>
+      <p:grpSpPr>
+        <a:xfrm>
+          <a:off x="0" y="0"/>
+          <a:ext cx="0" cy="0"/>
+          <a:chOff x="0" y="0"/>
+          <a:chExt cx="0" cy="0"/>
+        </a:xfrm>
+      </p:grpSpPr>
+      <p:sp>
+        <p:nvSpPr>
+          <p:cNvPr id="7" name="Text Placeholder 6">
+            <a:extLst>
+              <a:ext uri="{FF2B5EF4-FFF2-40B4-BE49-F238E27FC236}">
+                <a16:creationId xmlns:a16="http://schemas.microsoft.com/office/drawing/2014/main" id="{E9819C24-C574-4FFB-84D8-336AF5C4D19C}"/>
+              </a:ext>
+            </a:extLst>
+          </p:cNvPr>
+          <p:cNvSpPr>
+            <a:spLocks noGrp="1"/>
+          </p:cNvSpPr>
+          <p:nvPr>
+            <p:ph type="body" sz="quarter" idx="10"/>
+          </p:nvPr>
+        </p:nvSpPr>
+        <p:spPr>
+          <a:xfrm>
+            <a:off x="201930" y="1189179"/>
+            <a:ext cx="8740142" cy="5078313"/>
+          </a:xfrm>
+        </p:spPr>
+        <p:txBody>
+          <a:bodyPr/>
+          <a:lstStyle/>
+          <a:p>
+            <a:r>
+              <a:rPr lang="en-US" sz="2000" b="1" dirty="0"/>
+              <a:t>Design an identity solution  </a:t>
+            </a:r>
+          </a:p>
+          <a:p>
+            <a:pPr marL="288925" lvl="1" indent="0">
+              <a:buNone/>
+            </a:pPr>
+            <a:r>
+              <a:rPr lang="en-US" sz="1100" dirty="0"/>
+              <a:t>Design AD Connect synchronization; design federated identities using Active Directory Federation Services (AD FS); design solutions for Multi-Factor Authentication (MFA); design an architecture using Active Directory on-premises and Azure Active Directory (AAD); determine when to use Azure AD Domain Services; design security for Mobile Apps using AAD </a:t>
+            </a:r>
+          </a:p>
+          <a:p>
+            <a:r>
+              <a:rPr lang="en-US" sz="2000" b="1" dirty="0"/>
+              <a:t>Secure resources by using identity providers  </a:t>
+            </a:r>
+          </a:p>
+          <a:p>
+            <a:pPr marL="288925" lvl="1" indent="0">
+              <a:buNone/>
+            </a:pPr>
+            <a:r>
+              <a:rPr lang="en-US" sz="1100" dirty="0"/>
+              <a:t>Design solutions that use external or consumer identity providers such as Microsoft account, Facebook, Google, and Yahoo; determine when to use Azure AD B2C and Azure AD B2B; design mobile apps using AAD B2C or AAD B2B </a:t>
+            </a:r>
+          </a:p>
+          <a:p>
+            <a:r>
+              <a:rPr lang="en-US" sz="2000" b="1" dirty="0"/>
+              <a:t>Design a data security solution </a:t>
+            </a:r>
+          </a:p>
+          <a:p>
+            <a:pPr marL="288925" lvl="1" indent="0">
+              <a:buNone/>
+            </a:pPr>
+            <a:r>
+              <a:rPr lang="en-US" sz="1100" dirty="0"/>
+              <a:t>Design data security solutions for Azure services; determine when to use Azure Storage encryption, Azure Disk Encryption, Azure SQL Database security capabilities, and Azure Key Vault; design for protecting secrets in ARM templates using Azure Key Vault; design for protecting application secrets using Azure Key Vault; design a solution for managing certificates using Azure Key Vault; design solutions that use Azure AD Managed Service Identity </a:t>
+            </a:r>
+            <a:endParaRPr lang="en-US" sz="2000" dirty="0"/>
+          </a:p>
+          <a:p>
+            <a:r>
+              <a:rPr lang="en-US" sz="2000" b="1" dirty="0"/>
+              <a:t>Design a mechanism of governance and policies for administering Azure resources  </a:t>
+            </a:r>
+          </a:p>
+          <a:p>
+            <a:pPr marL="288925" lvl="1" indent="0">
+              <a:buNone/>
+            </a:pPr>
+            <a:r>
+              <a:rPr lang="en-US" sz="1100" dirty="0"/>
+              <a:t>Determine when to use Azure RBAC standard roles and custom roles; define an Azure RBAC strategy; determine when to use Azure resource policies; determine when to use Azure AD Privileged Identity Management; design solutions that use Azure AD Managed Service Identity; determine when to use HSM-backed keys  </a:t>
+            </a:r>
+          </a:p>
+          <a:p>
+            <a:r>
+              <a:rPr lang="en-US" sz="2000" b="1" dirty="0"/>
+              <a:t>Manage security risks by using an appropriate security solution </a:t>
+            </a:r>
+          </a:p>
+          <a:p>
+            <a:pPr marL="288925" lvl="1" indent="0">
+              <a:buNone/>
+            </a:pPr>
+            <a:r>
+              <a:rPr lang="en-US" sz="1100" dirty="0"/>
+              <a:t>Identify, assess, and mitigate security risks by using Azure Security Center, Operations Management Suite Security and Audit solutions, and other services; determine when to use Azure AD Identity Protection; determine when to use Advanced Threat Detection; determine an appropriate endpoint protection strategy</a:t>
+            </a:r>
+          </a:p>
+        </p:txBody>
+      </p:sp>
+      <p:sp>
+        <p:nvSpPr>
+          <p:cNvPr id="6" name="Title 5">
+            <a:extLst>
+              <a:ext uri="{FF2B5EF4-FFF2-40B4-BE49-F238E27FC236}">
+                <a16:creationId xmlns:a16="http://schemas.microsoft.com/office/drawing/2014/main" id="{E2A5C44B-11B8-48A2-8534-B32A9C5F9044}"/>
+              </a:ext>
+            </a:extLst>
+          </p:cNvPr>
+          <p:cNvSpPr>
+            <a:spLocks noGrp="1"/>
+          </p:cNvSpPr>
+          <p:nvPr>
+            <p:ph type="title"/>
+          </p:nvPr>
+        </p:nvSpPr>
+        <p:spPr/>
+        <p:txBody>
+          <a:bodyPr/>
+          <a:lstStyle/>
+          <a:p>
+            <a:r>
+              <a:rPr lang="en-US" dirty="0"/>
+              <a:t>Design Security and Identity Solutions (20-25%) </a:t>
+            </a:r>
+          </a:p>
+        </p:txBody>
+      </p:sp>
+      <p:sp>
+        <p:nvSpPr>
+          <p:cNvPr id="9" name="Text Placeholder 8">
+            <a:extLst>
+              <a:ext uri="{FF2B5EF4-FFF2-40B4-BE49-F238E27FC236}">
+                <a16:creationId xmlns:a16="http://schemas.microsoft.com/office/drawing/2014/main" id="{F8FDC03F-CE2A-428D-BEF3-3336579348B1}"/>
+              </a:ext>
+            </a:extLst>
+          </p:cNvPr>
+          <p:cNvSpPr>
+            <a:spLocks noGrp="1"/>
+          </p:cNvSpPr>
+          <p:nvPr>
+            <p:ph type="body" sz="quarter" idx="11"/>
+          </p:nvPr>
+        </p:nvSpPr>
+        <p:spPr/>
+        <p:txBody>
+          <a:bodyPr/>
+          <a:lstStyle/>
+          <a:p>
+            <a:endParaRPr lang="en-US"/>
+          </a:p>
+        </p:txBody>
+      </p:sp>
+    </p:spTree>
+    <p:extLst>
+      <p:ext uri="{BB962C8B-B14F-4D97-AF65-F5344CB8AC3E}">
+        <p14:creationId xmlns:p14="http://schemas.microsoft.com/office/powerpoint/2010/main" val="3338993660"/>
+      </p:ext>
+    </p:extLst>
+  </p:cSld>
+  <p:clrMapOvr>
+    <a:masterClrMapping/>
+  </p:clrMapOvr>
+</p:sld>
+</file>
+
+<file path=ppt/slides/slide11.xml><?xml version="1.0" encoding="utf-8"?>
 <p:sld xmlns:a="http://schemas.openxmlformats.org/drawingml/2006/main" xmlns:r="http://schemas.openxmlformats.org/officeDocument/2006/relationships" xmlns:p="http://schemas.openxmlformats.org/presentationml/2006/main">
   <p:cSld>
     <p:spTree>
@@ -14501,7 +14689,7 @@
 </p:sld>
 </file>
 
-<file path=ppt/slides/slide11.xml><?xml version="1.0" encoding="utf-8"?>
+<file path=ppt/slides/slide12.xml><?xml version="1.0" encoding="utf-8"?>
 <p:sld xmlns:a="http://schemas.openxmlformats.org/drawingml/2006/main" xmlns:r="http://schemas.openxmlformats.org/officeDocument/2006/relationships" xmlns:p="http://schemas.openxmlformats.org/presentationml/2006/main" show="0">
   <p:cSld>
     <p:spTree>
@@ -14677,7 +14865,7 @@
 </p:sld>
 </file>
 
-<file path=ppt/slides/slide12.xml><?xml version="1.0" encoding="utf-8"?>
+<file path=ppt/slides/slide13.xml><?xml version="1.0" encoding="utf-8"?>
 <p:sld xmlns:a="http://schemas.openxmlformats.org/drawingml/2006/main" xmlns:r="http://schemas.openxmlformats.org/officeDocument/2006/relationships" xmlns:p="http://schemas.openxmlformats.org/presentationml/2006/main">
   <p:cSld>
     <p:spTree>
@@ -14884,7 +15072,7 @@
 </p:sld>
 </file>
 
-<file path=ppt/slides/slide13.xml><?xml version="1.0" encoding="utf-8"?>
+<file path=ppt/slides/slide14.xml><?xml version="1.0" encoding="utf-8"?>
 <p:sld xmlns:a="http://schemas.openxmlformats.org/drawingml/2006/main" xmlns:r="http://schemas.openxmlformats.org/officeDocument/2006/relationships" xmlns:p="http://schemas.openxmlformats.org/presentationml/2006/main" show="0">
   <p:cSld>
     <p:spTree>
@@ -15025,114 +15213,6 @@
     <p:extLst>
       <p:ext uri="{BB962C8B-B14F-4D97-AF65-F5344CB8AC3E}">
         <p14:creationId xmlns:p14="http://schemas.microsoft.com/office/powerpoint/2010/main" val="4106459444"/>
-      </p:ext>
-    </p:extLst>
-  </p:cSld>
-  <p:clrMapOvr>
-    <a:masterClrMapping/>
-  </p:clrMapOvr>
-  <p:transition>
-    <p:fade/>
-  </p:transition>
-</p:sld>
-</file>
-
-<file path=ppt/slides/slide14.xml><?xml version="1.0" encoding="utf-8"?>
-<p:sld xmlns:a="http://schemas.openxmlformats.org/drawingml/2006/main" xmlns:r="http://schemas.openxmlformats.org/officeDocument/2006/relationships" xmlns:p="http://schemas.openxmlformats.org/presentationml/2006/main">
-  <p:cSld>
-    <p:spTree>
-      <p:nvGrpSpPr>
-        <p:cNvPr id="1" name=""/>
-        <p:cNvGrpSpPr/>
-        <p:nvPr/>
-      </p:nvGrpSpPr>
-      <p:grpSpPr>
-        <a:xfrm>
-          <a:off x="0" y="0"/>
-          <a:ext cx="0" cy="0"/>
-          <a:chOff x="0" y="0"/>
-          <a:chExt cx="0" cy="0"/>
-        </a:xfrm>
-      </p:grpSpPr>
-      <p:sp>
-        <p:nvSpPr>
-          <p:cNvPr id="5" name="Title 4">
-            <a:extLst>
-              <a:ext uri="{FF2B5EF4-FFF2-40B4-BE49-F238E27FC236}">
-                <a16:creationId xmlns:a16="http://schemas.microsoft.com/office/drawing/2014/main" id="{08ADEA70-0291-4B72-9963-1103847B70FB}"/>
-              </a:ext>
-            </a:extLst>
-          </p:cNvPr>
-          <p:cNvSpPr>
-            <a:spLocks noGrp="1"/>
-          </p:cNvSpPr>
-          <p:nvPr>
-            <p:ph type="title"/>
-          </p:nvPr>
-        </p:nvSpPr>
-        <p:spPr/>
-        <p:txBody>
-          <a:bodyPr/>
-          <a:lstStyle/>
-          <a:p>
-            <a:endParaRPr lang="en-US"/>
-          </a:p>
-        </p:txBody>
-      </p:sp>
-      <p:sp>
-        <p:nvSpPr>
-          <p:cNvPr id="7" name="Text Placeholder 6">
-            <a:extLst>
-              <a:ext uri="{FF2B5EF4-FFF2-40B4-BE49-F238E27FC236}">
-                <a16:creationId xmlns:a16="http://schemas.microsoft.com/office/drawing/2014/main" id="{8761CA1C-A62D-4791-80E3-1647AB49EF35}"/>
-              </a:ext>
-            </a:extLst>
-          </p:cNvPr>
-          <p:cNvSpPr>
-            <a:spLocks noGrp="1"/>
-          </p:cNvSpPr>
-          <p:nvPr>
-            <p:ph type="body" sz="quarter" idx="11"/>
-          </p:nvPr>
-        </p:nvSpPr>
-        <p:spPr/>
-        <p:txBody>
-          <a:bodyPr/>
-          <a:lstStyle/>
-          <a:p>
-            <a:endParaRPr lang="en-US"/>
-          </a:p>
-        </p:txBody>
-      </p:sp>
-      <p:sp>
-        <p:nvSpPr>
-          <p:cNvPr id="6" name="Text Placeholder 5">
-            <a:extLst>
-              <a:ext uri="{FF2B5EF4-FFF2-40B4-BE49-F238E27FC236}">
-                <a16:creationId xmlns:a16="http://schemas.microsoft.com/office/drawing/2014/main" id="{898B891A-9DAD-4484-9795-2DB4A3204307}"/>
-              </a:ext>
-            </a:extLst>
-          </p:cNvPr>
-          <p:cNvSpPr>
-            <a:spLocks noGrp="1"/>
-          </p:cNvSpPr>
-          <p:nvPr>
-            <p:ph type="body" sz="quarter" idx="10"/>
-          </p:nvPr>
-        </p:nvSpPr>
-        <p:spPr/>
-        <p:txBody>
-          <a:bodyPr/>
-          <a:lstStyle/>
-          <a:p>
-            <a:endParaRPr lang="en-US"/>
-          </a:p>
-        </p:txBody>
-      </p:sp>
-    </p:spTree>
-    <p:extLst>
-      <p:ext uri="{BB962C8B-B14F-4D97-AF65-F5344CB8AC3E}">
-        <p14:creationId xmlns:p14="http://schemas.microsoft.com/office/powerpoint/2010/main" val="3844760331"/>
       </p:ext>
     </p:extLst>
   </p:cSld>
@@ -15167,7 +15247,7 @@
           <p:cNvPr id="5" name="Title 4">
             <a:extLst>
               <a:ext uri="{FF2B5EF4-FFF2-40B4-BE49-F238E27FC236}">
-                <a16:creationId xmlns:a16="http://schemas.microsoft.com/office/drawing/2014/main" id="{90782058-14FA-4576-AC47-7C8609E7E48D}"/>
+                <a16:creationId xmlns:a16="http://schemas.microsoft.com/office/drawing/2014/main" id="{08ADEA70-0291-4B72-9963-1103847B70FB}"/>
               </a:ext>
             </a:extLst>
           </p:cNvPr>
@@ -15189,10 +15269,10 @@
       </p:sp>
       <p:sp>
         <p:nvSpPr>
-          <p:cNvPr id="6" name="Content Placeholder 5">
+          <p:cNvPr id="7" name="Text Placeholder 6">
             <a:extLst>
               <a:ext uri="{FF2B5EF4-FFF2-40B4-BE49-F238E27FC236}">
-                <a16:creationId xmlns:a16="http://schemas.microsoft.com/office/drawing/2014/main" id="{D8F9C882-E0A7-4A7A-A8B8-2656E1326883}"/>
+                <a16:creationId xmlns:a16="http://schemas.microsoft.com/office/drawing/2014/main" id="{8761CA1C-A62D-4791-80E3-1647AB49EF35}"/>
               </a:ext>
             </a:extLst>
           </p:cNvPr>
@@ -15200,7 +15280,7 @@
             <a:spLocks noGrp="1"/>
           </p:cNvSpPr>
           <p:nvPr>
-            <p:ph idx="1"/>
+            <p:ph type="body" sz="quarter" idx="11"/>
           </p:nvPr>
         </p:nvSpPr>
         <p:spPr/>
@@ -15214,10 +15294,10 @@
       </p:sp>
       <p:sp>
         <p:nvSpPr>
-          <p:cNvPr id="7" name="Text Placeholder 6">
+          <p:cNvPr id="6" name="Text Placeholder 5">
             <a:extLst>
               <a:ext uri="{FF2B5EF4-FFF2-40B4-BE49-F238E27FC236}">
-                <a16:creationId xmlns:a16="http://schemas.microsoft.com/office/drawing/2014/main" id="{CF4E6B3B-2CE9-4739-AC40-9FDE4F13A195}"/>
+                <a16:creationId xmlns:a16="http://schemas.microsoft.com/office/drawing/2014/main" id="{898B891A-9DAD-4484-9795-2DB4A3204307}"/>
               </a:ext>
             </a:extLst>
           </p:cNvPr>
@@ -15233,20 +15313,23 @@
           <a:bodyPr/>
           <a:lstStyle/>
           <a:p>
-            <a:endParaRPr lang="en-US" dirty="0"/>
+            <a:endParaRPr lang="en-US"/>
           </a:p>
         </p:txBody>
       </p:sp>
     </p:spTree>
     <p:extLst>
       <p:ext uri="{BB962C8B-B14F-4D97-AF65-F5344CB8AC3E}">
-        <p14:creationId xmlns:p14="http://schemas.microsoft.com/office/powerpoint/2010/main" val="4208879036"/>
+        <p14:creationId xmlns:p14="http://schemas.microsoft.com/office/powerpoint/2010/main" val="3844760331"/>
       </p:ext>
     </p:extLst>
   </p:cSld>
   <p:clrMapOvr>
     <a:masterClrMapping/>
   </p:clrMapOvr>
+  <p:transition>
+    <p:fade/>
+  </p:transition>
 </p:sld>
 </file>
 
@@ -15272,7 +15355,7 @@
           <p:cNvPr id="5" name="Title 4">
             <a:extLst>
               <a:ext uri="{FF2B5EF4-FFF2-40B4-BE49-F238E27FC236}">
-                <a16:creationId xmlns:a16="http://schemas.microsoft.com/office/drawing/2014/main" id="{1EC61856-5169-45C5-9111-875F85B333DC}"/>
+                <a16:creationId xmlns:a16="http://schemas.microsoft.com/office/drawing/2014/main" id="{90782058-14FA-4576-AC47-7C8609E7E48D}"/>
               </a:ext>
             </a:extLst>
           </p:cNvPr>
@@ -15297,7 +15380,7 @@
           <p:cNvPr id="6" name="Content Placeholder 5">
             <a:extLst>
               <a:ext uri="{FF2B5EF4-FFF2-40B4-BE49-F238E27FC236}">
-                <a16:creationId xmlns:a16="http://schemas.microsoft.com/office/drawing/2014/main" id="{153420EE-FC7C-459F-90FD-1857D3DE4D74}"/>
+                <a16:creationId xmlns:a16="http://schemas.microsoft.com/office/drawing/2014/main" id="{D8F9C882-E0A7-4A7A-A8B8-2656E1326883}"/>
               </a:ext>
             </a:extLst>
           </p:cNvPr>
@@ -15313,7 +15396,7 @@
           <a:bodyPr/>
           <a:lstStyle/>
           <a:p>
-            <a:endParaRPr lang="en-US" dirty="0"/>
+            <a:endParaRPr lang="en-US"/>
           </a:p>
         </p:txBody>
       </p:sp>
@@ -15322,7 +15405,7 @@
           <p:cNvPr id="7" name="Text Placeholder 6">
             <a:extLst>
               <a:ext uri="{FF2B5EF4-FFF2-40B4-BE49-F238E27FC236}">
-                <a16:creationId xmlns:a16="http://schemas.microsoft.com/office/drawing/2014/main" id="{0060A6CD-CF73-4CBE-9026-8943DCA5D1DB}"/>
+                <a16:creationId xmlns:a16="http://schemas.microsoft.com/office/drawing/2014/main" id="{CF4E6B3B-2CE9-4739-AC40-9FDE4F13A195}"/>
               </a:ext>
             </a:extLst>
           </p:cNvPr>
@@ -15345,7 +15428,7 @@
     </p:spTree>
     <p:extLst>
       <p:ext uri="{BB962C8B-B14F-4D97-AF65-F5344CB8AC3E}">
-        <p14:creationId xmlns:p14="http://schemas.microsoft.com/office/powerpoint/2010/main" val="3688551044"/>
+        <p14:creationId xmlns:p14="http://schemas.microsoft.com/office/powerpoint/2010/main" val="4208879036"/>
       </p:ext>
     </p:extLst>
   </p:cSld>
@@ -15374,6 +15457,111 @@
       </p:grpSpPr>
       <p:sp>
         <p:nvSpPr>
+          <p:cNvPr id="5" name="Title 4">
+            <a:extLst>
+              <a:ext uri="{FF2B5EF4-FFF2-40B4-BE49-F238E27FC236}">
+                <a16:creationId xmlns:a16="http://schemas.microsoft.com/office/drawing/2014/main" id="{1EC61856-5169-45C5-9111-875F85B333DC}"/>
+              </a:ext>
+            </a:extLst>
+          </p:cNvPr>
+          <p:cNvSpPr>
+            <a:spLocks noGrp="1"/>
+          </p:cNvSpPr>
+          <p:nvPr>
+            <p:ph type="title"/>
+          </p:nvPr>
+        </p:nvSpPr>
+        <p:spPr/>
+        <p:txBody>
+          <a:bodyPr/>
+          <a:lstStyle/>
+          <a:p>
+            <a:endParaRPr lang="en-US"/>
+          </a:p>
+        </p:txBody>
+      </p:sp>
+      <p:sp>
+        <p:nvSpPr>
+          <p:cNvPr id="6" name="Content Placeholder 5">
+            <a:extLst>
+              <a:ext uri="{FF2B5EF4-FFF2-40B4-BE49-F238E27FC236}">
+                <a16:creationId xmlns:a16="http://schemas.microsoft.com/office/drawing/2014/main" id="{153420EE-FC7C-459F-90FD-1857D3DE4D74}"/>
+              </a:ext>
+            </a:extLst>
+          </p:cNvPr>
+          <p:cNvSpPr>
+            <a:spLocks noGrp="1"/>
+          </p:cNvSpPr>
+          <p:nvPr>
+            <p:ph idx="1"/>
+          </p:nvPr>
+        </p:nvSpPr>
+        <p:spPr/>
+        <p:txBody>
+          <a:bodyPr/>
+          <a:lstStyle/>
+          <a:p>
+            <a:endParaRPr lang="en-US" dirty="0"/>
+          </a:p>
+        </p:txBody>
+      </p:sp>
+      <p:sp>
+        <p:nvSpPr>
+          <p:cNvPr id="7" name="Text Placeholder 6">
+            <a:extLst>
+              <a:ext uri="{FF2B5EF4-FFF2-40B4-BE49-F238E27FC236}">
+                <a16:creationId xmlns:a16="http://schemas.microsoft.com/office/drawing/2014/main" id="{0060A6CD-CF73-4CBE-9026-8943DCA5D1DB}"/>
+              </a:ext>
+            </a:extLst>
+          </p:cNvPr>
+          <p:cNvSpPr>
+            <a:spLocks noGrp="1"/>
+          </p:cNvSpPr>
+          <p:nvPr>
+            <p:ph type="body" sz="quarter" idx="10"/>
+          </p:nvPr>
+        </p:nvSpPr>
+        <p:spPr/>
+        <p:txBody>
+          <a:bodyPr/>
+          <a:lstStyle/>
+          <a:p>
+            <a:endParaRPr lang="en-US" dirty="0"/>
+          </a:p>
+        </p:txBody>
+      </p:sp>
+    </p:spTree>
+    <p:extLst>
+      <p:ext uri="{BB962C8B-B14F-4D97-AF65-F5344CB8AC3E}">
+        <p14:creationId xmlns:p14="http://schemas.microsoft.com/office/powerpoint/2010/main" val="3688551044"/>
+      </p:ext>
+    </p:extLst>
+  </p:cSld>
+  <p:clrMapOvr>
+    <a:masterClrMapping/>
+  </p:clrMapOvr>
+</p:sld>
+</file>
+
+<file path=ppt/slides/slide18.xml><?xml version="1.0" encoding="utf-8"?>
+<p:sld xmlns:a="http://schemas.openxmlformats.org/drawingml/2006/main" xmlns:r="http://schemas.openxmlformats.org/officeDocument/2006/relationships" xmlns:p="http://schemas.openxmlformats.org/presentationml/2006/main">
+  <p:cSld>
+    <p:spTree>
+      <p:nvGrpSpPr>
+        <p:cNvPr id="1" name=""/>
+        <p:cNvGrpSpPr/>
+        <p:nvPr/>
+      </p:nvGrpSpPr>
+      <p:grpSpPr>
+        <a:xfrm>
+          <a:off x="0" y="0"/>
+          <a:ext cx="0" cy="0"/>
+          <a:chOff x="0" y="0"/>
+          <a:chExt cx="0" cy="0"/>
+        </a:xfrm>
+      </p:grpSpPr>
+      <p:sp>
+        <p:nvSpPr>
           <p:cNvPr id="2" name="Title 1">
             <a:extLst>
               <a:ext uri="{FF2B5EF4-FFF2-40B4-BE49-F238E27FC236}">
@@ -15485,7 +15673,7 @@
 </p:sld>
 </file>
 
-<file path=ppt/slides/slide18.xml><?xml version="1.0" encoding="utf-8"?>
+<file path=ppt/slides/slide19.xml><?xml version="1.0" encoding="utf-8"?>
 <p:sld xmlns:a="http://schemas.openxmlformats.org/drawingml/2006/main" xmlns:r="http://schemas.openxmlformats.org/officeDocument/2006/relationships" xmlns:p="http://schemas.openxmlformats.org/presentationml/2006/main">
   <p:cSld>
     <p:spTree>
@@ -15609,6 +15797,203 @@
       </p:grpSpPr>
       <p:sp>
         <p:nvSpPr>
+          <p:cNvPr id="2" name="Title 1">
+            <a:extLst>
+              <a:ext uri="{FF2B5EF4-FFF2-40B4-BE49-F238E27FC236}">
+                <a16:creationId xmlns:a16="http://schemas.microsoft.com/office/drawing/2014/main" id="{CDFD4CD9-4330-4B7F-B215-A7BED91ED4D2}"/>
+              </a:ext>
+            </a:extLst>
+          </p:cNvPr>
+          <p:cNvSpPr>
+            <a:spLocks noGrp="1"/>
+          </p:cNvSpPr>
+          <p:nvPr>
+            <p:ph type="ctrTitle" sz="quarter"/>
+          </p:nvPr>
+        </p:nvSpPr>
+        <p:spPr/>
+        <p:txBody>
+          <a:bodyPr/>
+          <a:lstStyle/>
+          <a:p>
+            <a:r>
+              <a:rPr lang="en-US" sz="1500" dirty="0">
+                <a:solidFill>
+                  <a:srgbClr val="FFFFFF"/>
+                </a:solidFill>
+              </a:rPr>
+              <a:t>Exam</a:t>
+            </a:r>
+            <a:r>
+              <a:rPr lang="en-US" sz="2700" dirty="0">
+                <a:solidFill>
+                  <a:srgbClr val="FFFFFF"/>
+                </a:solidFill>
+              </a:rPr>
+              <a:t> 70-535 Architecting Microsoft Azure Solutions</a:t>
+            </a:r>
+            <a:br>
+              <a:rPr lang="en-US" sz="2700" dirty="0">
+                <a:solidFill>
+                  <a:srgbClr val="FFFFFF"/>
+                </a:solidFill>
+              </a:rPr>
+            </a:br>
+            <a:r>
+              <a:rPr lang="en-US" sz="1800" dirty="0">
+                <a:solidFill>
+                  <a:srgbClr val="FFFFFF"/>
+                </a:solidFill>
+              </a:rPr>
+              <a:t>Data &amp; Cloud Skill Up Workshop - Azure Fundamentals </a:t>
+            </a:r>
+            <a:endParaRPr lang="en-US" dirty="0"/>
+          </a:p>
+        </p:txBody>
+      </p:sp>
+      <p:sp>
+        <p:nvSpPr>
+          <p:cNvPr id="3" name="Subtitle 2">
+            <a:extLst>
+              <a:ext uri="{FF2B5EF4-FFF2-40B4-BE49-F238E27FC236}">
+                <a16:creationId xmlns:a16="http://schemas.microsoft.com/office/drawing/2014/main" id="{A4C07415-3D36-4383-9226-03906D63414E}"/>
+              </a:ext>
+            </a:extLst>
+          </p:cNvPr>
+          <p:cNvSpPr>
+            <a:spLocks noGrp="1"/>
+          </p:cNvSpPr>
+          <p:nvPr>
+            <p:ph type="subTitle" sz="quarter" idx="1"/>
+          </p:nvPr>
+        </p:nvSpPr>
+        <p:spPr/>
+        <p:txBody>
+          <a:bodyPr/>
+          <a:lstStyle/>
+          <a:p>
+            <a:r>
+              <a:rPr lang="en-US" dirty="0"/>
+              <a:t>Design Compute Infrastructure (20-25%)</a:t>
+            </a:r>
+          </a:p>
+          <a:p>
+            <a:r>
+              <a:rPr lang="en-US" dirty="0"/>
+              <a:t>Design Data Implementation (15-20%)</a:t>
+            </a:r>
+          </a:p>
+          <a:p>
+            <a:r>
+              <a:rPr lang="en-US" dirty="0"/>
+              <a:t>Design Networking Implementation (15-20%)</a:t>
+            </a:r>
+          </a:p>
+          <a:p>
+            <a:r>
+              <a:rPr lang="en-US" dirty="0"/>
+              <a:t>Design Security and Identity Solutions (20-25%)</a:t>
+            </a:r>
+          </a:p>
+          <a:p>
+            <a:r>
+              <a:rPr lang="en-US" dirty="0"/>
+              <a:t>Design Solutions by using Platform Services (10-15%)</a:t>
+            </a:r>
+          </a:p>
+          <a:p>
+            <a:r>
+              <a:rPr lang="en-US" dirty="0"/>
+              <a:t>Design for Operations (10-15%)</a:t>
+            </a:r>
+          </a:p>
+          <a:p>
+            <a:endParaRPr lang="en-US" dirty="0"/>
+          </a:p>
+        </p:txBody>
+      </p:sp>
+      <p:sp>
+        <p:nvSpPr>
+          <p:cNvPr id="4" name="Text Placeholder 3">
+            <a:extLst>
+              <a:ext uri="{FF2B5EF4-FFF2-40B4-BE49-F238E27FC236}">
+                <a16:creationId xmlns:a16="http://schemas.microsoft.com/office/drawing/2014/main" id="{443FD9DA-8AE8-4EAF-B589-7746F79960D9}"/>
+              </a:ext>
+            </a:extLst>
+          </p:cNvPr>
+          <p:cNvSpPr>
+            <a:spLocks noGrp="1"/>
+          </p:cNvSpPr>
+          <p:nvPr>
+            <p:ph type="body" sz="quarter" idx="10"/>
+          </p:nvPr>
+        </p:nvSpPr>
+        <p:spPr/>
+        <p:txBody>
+          <a:bodyPr/>
+          <a:lstStyle/>
+          <a:p>
+            <a:endParaRPr lang="en-US"/>
+          </a:p>
+        </p:txBody>
+      </p:sp>
+      <p:sp>
+        <p:nvSpPr>
+          <p:cNvPr id="5" name="Text Placeholder 4">
+            <a:extLst>
+              <a:ext uri="{FF2B5EF4-FFF2-40B4-BE49-F238E27FC236}">
+                <a16:creationId xmlns:a16="http://schemas.microsoft.com/office/drawing/2014/main" id="{244052A8-8CA4-4E4A-A522-A538E009AAE3}"/>
+              </a:ext>
+            </a:extLst>
+          </p:cNvPr>
+          <p:cNvSpPr>
+            <a:spLocks noGrp="1"/>
+          </p:cNvSpPr>
+          <p:nvPr>
+            <p:ph type="body" sz="quarter" idx="11"/>
+          </p:nvPr>
+        </p:nvSpPr>
+        <p:spPr/>
+        <p:txBody>
+          <a:bodyPr/>
+          <a:lstStyle/>
+          <a:p>
+            <a:endParaRPr lang="en-US"/>
+          </a:p>
+        </p:txBody>
+      </p:sp>
+    </p:spTree>
+    <p:extLst>
+      <p:ext uri="{BB962C8B-B14F-4D97-AF65-F5344CB8AC3E}">
+        <p14:creationId xmlns:p14="http://schemas.microsoft.com/office/powerpoint/2010/main" val="1880287371"/>
+      </p:ext>
+    </p:extLst>
+  </p:cSld>
+  <p:clrMapOvr>
+    <a:masterClrMapping/>
+  </p:clrMapOvr>
+</p:sld>
+</file>
+
+<file path=ppt/slides/slide3.xml><?xml version="1.0" encoding="utf-8"?>
+<p:sld xmlns:a="http://schemas.openxmlformats.org/drawingml/2006/main" xmlns:r="http://schemas.openxmlformats.org/officeDocument/2006/relationships" xmlns:p="http://schemas.openxmlformats.org/presentationml/2006/main">
+  <p:cSld>
+    <p:spTree>
+      <p:nvGrpSpPr>
+        <p:cNvPr id="1" name=""/>
+        <p:cNvGrpSpPr/>
+        <p:nvPr/>
+      </p:nvGrpSpPr>
+      <p:grpSpPr>
+        <a:xfrm>
+          <a:off x="0" y="0"/>
+          <a:ext cx="0" cy="0"/>
+          <a:chOff x="0" y="0"/>
+          <a:chExt cx="0" cy="0"/>
+        </a:xfrm>
+      </p:grpSpPr>
+      <p:sp>
+        <p:nvSpPr>
           <p:cNvPr id="5" name="Title 4">
             <a:extLst>
               <a:ext uri="{FF2B5EF4-FFF2-40B4-BE49-F238E27FC236}">
@@ -15793,7 +16178,7 @@
 </p:sld>
 </file>
 
-<file path=ppt/slides/slide3.xml><?xml version="1.0" encoding="utf-8"?>
+<file path=ppt/slides/slide4.xml><?xml version="1.0" encoding="utf-8"?>
 <p:sld xmlns:a="http://schemas.openxmlformats.org/drawingml/2006/main" xmlns:r="http://schemas.openxmlformats.org/officeDocument/2006/relationships" xmlns:p="http://schemas.openxmlformats.org/presentationml/2006/main" show="0">
   <p:cSld>
     <p:spTree>
@@ -16039,7 +16424,7 @@
 </p:sld>
 </file>
 
-<file path=ppt/slides/slide4.xml><?xml version="1.0" encoding="utf-8"?>
+<file path=ppt/slides/slide5.xml><?xml version="1.0" encoding="utf-8"?>
 <p:sld xmlns:a="http://schemas.openxmlformats.org/drawingml/2006/main" xmlns:r="http://schemas.openxmlformats.org/officeDocument/2006/relationships" xmlns:p="http://schemas.openxmlformats.org/presentationml/2006/main">
   <p:cSld>
     <p:spTree>
@@ -16234,7 +16619,7 @@
 </p:sld>
 </file>
 
-<file path=ppt/slides/slide5.xml><?xml version="1.0" encoding="utf-8"?>
+<file path=ppt/slides/slide6.xml><?xml version="1.0" encoding="utf-8"?>
 <p:sld xmlns:a="http://schemas.openxmlformats.org/drawingml/2006/main" xmlns:r="http://schemas.openxmlformats.org/officeDocument/2006/relationships" xmlns:p="http://schemas.openxmlformats.org/presentationml/2006/main" show="0">
   <p:cSld>
     <p:spTree>
@@ -16430,7 +16815,7 @@
 </p:sld>
 </file>
 
-<file path=ppt/slides/slide6.xml><?xml version="1.0" encoding="utf-8"?>
+<file path=ppt/slides/slide7.xml><?xml version="1.0" encoding="utf-8"?>
 <p:sld xmlns:a="http://schemas.openxmlformats.org/drawingml/2006/main" xmlns:r="http://schemas.openxmlformats.org/officeDocument/2006/relationships" xmlns:p="http://schemas.openxmlformats.org/presentationml/2006/main">
   <p:cSld>
     <p:spTree>
@@ -16642,7 +17027,7 @@
 </p:sld>
 </file>
 
-<file path=ppt/slides/slide7.xml><?xml version="1.0" encoding="utf-8"?>
+<file path=ppt/slides/slide8.xml><?xml version="1.0" encoding="utf-8"?>
 <p:sld xmlns:a="http://schemas.openxmlformats.org/drawingml/2006/main" xmlns:r="http://schemas.openxmlformats.org/officeDocument/2006/relationships" xmlns:p="http://schemas.openxmlformats.org/presentationml/2006/main" show="0">
   <p:cSld>
     <p:spTree>
@@ -16837,7 +17222,7 @@
 </p:sld>
 </file>
 
-<file path=ppt/slides/slide8.xml><?xml version="1.0" encoding="utf-8"?>
+<file path=ppt/slides/slide9.xml><?xml version="1.0" encoding="utf-8"?>
 <p:sld xmlns:a="http://schemas.openxmlformats.org/drawingml/2006/main" xmlns:r="http://schemas.openxmlformats.org/officeDocument/2006/relationships" xmlns:p="http://schemas.openxmlformats.org/presentationml/2006/main">
   <p:cSld>
     <p:spTree>
@@ -17057,192 +17442,6 @@
     <p:extLst>
       <p:ext uri="{BB962C8B-B14F-4D97-AF65-F5344CB8AC3E}">
         <p14:creationId xmlns:p14="http://schemas.microsoft.com/office/powerpoint/2010/main" val="1648903472"/>
-      </p:ext>
-    </p:extLst>
-  </p:cSld>
-  <p:clrMapOvr>
-    <a:masterClrMapping/>
-  </p:clrMapOvr>
-</p:sld>
-</file>
-
-<file path=ppt/slides/slide9.xml><?xml version="1.0" encoding="utf-8"?>
-<p:sld xmlns:a="http://schemas.openxmlformats.org/drawingml/2006/main" xmlns:r="http://schemas.openxmlformats.org/officeDocument/2006/relationships" xmlns:p="http://schemas.openxmlformats.org/presentationml/2006/main" show="0">
-  <p:cSld>
-    <p:spTree>
-      <p:nvGrpSpPr>
-        <p:cNvPr id="1" name=""/>
-        <p:cNvGrpSpPr/>
-        <p:nvPr/>
-      </p:nvGrpSpPr>
-      <p:grpSpPr>
-        <a:xfrm>
-          <a:off x="0" y="0"/>
-          <a:ext cx="0" cy="0"/>
-          <a:chOff x="0" y="0"/>
-          <a:chExt cx="0" cy="0"/>
-        </a:xfrm>
-      </p:grpSpPr>
-      <p:sp>
-        <p:nvSpPr>
-          <p:cNvPr id="7" name="Text Placeholder 6">
-            <a:extLst>
-              <a:ext uri="{FF2B5EF4-FFF2-40B4-BE49-F238E27FC236}">
-                <a16:creationId xmlns:a16="http://schemas.microsoft.com/office/drawing/2014/main" id="{E9819C24-C574-4FFB-84D8-336AF5C4D19C}"/>
-              </a:ext>
-            </a:extLst>
-          </p:cNvPr>
-          <p:cNvSpPr>
-            <a:spLocks noGrp="1"/>
-          </p:cNvSpPr>
-          <p:nvPr>
-            <p:ph type="body" sz="quarter" idx="10"/>
-          </p:nvPr>
-        </p:nvSpPr>
-        <p:spPr>
-          <a:xfrm>
-            <a:off x="201930" y="1189179"/>
-            <a:ext cx="8740142" cy="5078313"/>
-          </a:xfrm>
-        </p:spPr>
-        <p:txBody>
-          <a:bodyPr/>
-          <a:lstStyle/>
-          <a:p>
-            <a:r>
-              <a:rPr lang="en-US" sz="2000" b="1" dirty="0"/>
-              <a:t>Design an identity solution  </a:t>
-            </a:r>
-          </a:p>
-          <a:p>
-            <a:pPr marL="288925" lvl="1" indent="0">
-              <a:buNone/>
-            </a:pPr>
-            <a:r>
-              <a:rPr lang="en-US" sz="1100" dirty="0"/>
-              <a:t>Design AD Connect synchronization; design federated identities using Active Directory Federation Services (AD FS); design solutions for Multi-Factor Authentication (MFA); design an architecture using Active Directory on-premises and Azure Active Directory (AAD); determine when to use Azure AD Domain Services; design security for Mobile Apps using AAD </a:t>
-            </a:r>
-          </a:p>
-          <a:p>
-            <a:r>
-              <a:rPr lang="en-US" sz="2000" b="1" dirty="0"/>
-              <a:t>Secure resources by using identity providers  </a:t>
-            </a:r>
-          </a:p>
-          <a:p>
-            <a:pPr marL="288925" lvl="1" indent="0">
-              <a:buNone/>
-            </a:pPr>
-            <a:r>
-              <a:rPr lang="en-US" sz="1100" dirty="0"/>
-              <a:t>Design solutions that use external or consumer identity providers such as Microsoft account, Facebook, Google, and Yahoo; determine when to use Azure AD B2C and Azure AD B2B; design mobile apps using AAD B2C or AAD B2B </a:t>
-            </a:r>
-          </a:p>
-          <a:p>
-            <a:r>
-              <a:rPr lang="en-US" sz="2000" b="1" dirty="0"/>
-              <a:t>Design a data security solution </a:t>
-            </a:r>
-          </a:p>
-          <a:p>
-            <a:pPr marL="288925" lvl="1" indent="0">
-              <a:buNone/>
-            </a:pPr>
-            <a:r>
-              <a:rPr lang="en-US" sz="1100" dirty="0"/>
-              <a:t>Design data security solutions for Azure services; determine when to use Azure Storage encryption, Azure Disk Encryption, Azure SQL Database security capabilities, and Azure Key Vault; design for protecting secrets in ARM templates using Azure Key Vault; design for protecting application secrets using Azure Key Vault; design a solution for managing certificates using Azure Key Vault; design solutions that use Azure AD Managed Service Identity </a:t>
-            </a:r>
-            <a:endParaRPr lang="en-US" sz="2000" dirty="0"/>
-          </a:p>
-          <a:p>
-            <a:r>
-              <a:rPr lang="en-US" sz="2000" b="1" dirty="0"/>
-              <a:t>Design a mechanism of governance and policies for administering Azure resources  </a:t>
-            </a:r>
-          </a:p>
-          <a:p>
-            <a:pPr marL="288925" lvl="1" indent="0">
-              <a:buNone/>
-            </a:pPr>
-            <a:r>
-              <a:rPr lang="en-US" sz="1100" dirty="0"/>
-              <a:t>Determine when to use Azure RBAC standard roles and custom roles; define an Azure RBAC strategy; determine when to use Azure resource policies; determine when to use Azure AD Privileged Identity Management; design solutions that use Azure AD Managed Service Identity; determine when to use HSM-backed keys  </a:t>
-            </a:r>
-          </a:p>
-          <a:p>
-            <a:r>
-              <a:rPr lang="en-US" sz="2000" b="1" dirty="0"/>
-              <a:t>Manage security risks by using an appropriate security solution </a:t>
-            </a:r>
-          </a:p>
-          <a:p>
-            <a:pPr marL="288925" lvl="1" indent="0">
-              <a:buNone/>
-            </a:pPr>
-            <a:r>
-              <a:rPr lang="en-US" sz="1100" dirty="0"/>
-              <a:t>Identify, assess, and mitigate security risks by using Azure Security Center, Operations Management Suite Security and Audit solutions, and other services; determine when to use Azure AD Identity Protection; determine when to use Advanced Threat Detection; determine an appropriate endpoint protection strategy</a:t>
-            </a:r>
-          </a:p>
-        </p:txBody>
-      </p:sp>
-      <p:sp>
-        <p:nvSpPr>
-          <p:cNvPr id="6" name="Title 5">
-            <a:extLst>
-              <a:ext uri="{FF2B5EF4-FFF2-40B4-BE49-F238E27FC236}">
-                <a16:creationId xmlns:a16="http://schemas.microsoft.com/office/drawing/2014/main" id="{E2A5C44B-11B8-48A2-8534-B32A9C5F9044}"/>
-              </a:ext>
-            </a:extLst>
-          </p:cNvPr>
-          <p:cNvSpPr>
-            <a:spLocks noGrp="1"/>
-          </p:cNvSpPr>
-          <p:nvPr>
-            <p:ph type="title"/>
-          </p:nvPr>
-        </p:nvSpPr>
-        <p:spPr/>
-        <p:txBody>
-          <a:bodyPr/>
-          <a:lstStyle/>
-          <a:p>
-            <a:r>
-              <a:rPr lang="en-US" dirty="0"/>
-              <a:t>Design Security and Identity Solutions (20-25%) </a:t>
-            </a:r>
-          </a:p>
-        </p:txBody>
-      </p:sp>
-      <p:sp>
-        <p:nvSpPr>
-          <p:cNvPr id="9" name="Text Placeholder 8">
-            <a:extLst>
-              <a:ext uri="{FF2B5EF4-FFF2-40B4-BE49-F238E27FC236}">
-                <a16:creationId xmlns:a16="http://schemas.microsoft.com/office/drawing/2014/main" id="{F8FDC03F-CE2A-428D-BEF3-3336579348B1}"/>
-              </a:ext>
-            </a:extLst>
-          </p:cNvPr>
-          <p:cNvSpPr>
-            <a:spLocks noGrp="1"/>
-          </p:cNvSpPr>
-          <p:nvPr>
-            <p:ph type="body" sz="quarter" idx="11"/>
-          </p:nvPr>
-        </p:nvSpPr>
-        <p:spPr/>
-        <p:txBody>
-          <a:bodyPr/>
-          <a:lstStyle/>
-          <a:p>
-            <a:endParaRPr lang="en-US"/>
-          </a:p>
-        </p:txBody>
-      </p:sp>
-    </p:spTree>
-    <p:extLst>
-      <p:ext uri="{BB962C8B-B14F-4D97-AF65-F5344CB8AC3E}">
-        <p14:creationId xmlns:p14="http://schemas.microsoft.com/office/powerpoint/2010/main" val="3338993660"/>
       </p:ext>
     </p:extLst>
   </p:cSld>

</xml_diff>

<commit_message>
Add non-bulleted text layout to template
</commit_message>
<xml_diff>
--- a/Master Slides/70-535-00-Template.pptx
+++ b/Master Slides/70-535-00-Template.pptx
@@ -35,37 +35,37 @@
   <p:notesSz cx="6858000" cy="9144000"/>
   <p:embeddedFontLst>
     <p:embeddedFont>
-      <p:font typeface="Verdana" panose="020B0604030504040204" pitchFamily="34" charset="0"/>
+      <p:font typeface="Calibri" panose="020F0502020204030204" pitchFamily="34" charset="0"/>
       <p:regular r:id="rId23"/>
       <p:bold r:id="rId24"/>
       <p:italic r:id="rId25"/>
       <p:boldItalic r:id="rId26"/>
     </p:embeddedFont>
     <p:embeddedFont>
-      <p:font typeface="Segoe UI Light" panose="020B0502040204020203" pitchFamily="34" charset="0"/>
+      <p:font typeface="Consolas" panose="020B0609020204030204" pitchFamily="49" charset="0"/>
       <p:regular r:id="rId27"/>
-      <p:italic r:id="rId28"/>
-    </p:embeddedFont>
-    <p:embeddedFont>
-      <p:font typeface="Calibri" panose="020F0502020204030204" pitchFamily="34" charset="0"/>
-      <p:regular r:id="rId29"/>
-      <p:bold r:id="rId30"/>
-      <p:italic r:id="rId31"/>
-      <p:boldItalic r:id="rId32"/>
-    </p:embeddedFont>
-    <p:embeddedFont>
-      <p:font typeface="Consolas" panose="020B0609020204030204" pitchFamily="49" charset="0"/>
-      <p:regular r:id="rId33"/>
-      <p:bold r:id="rId34"/>
-      <p:italic r:id="rId35"/>
-      <p:boldItalic r:id="rId36"/>
+      <p:bold r:id="rId28"/>
+      <p:italic r:id="rId29"/>
+      <p:boldItalic r:id="rId30"/>
     </p:embeddedFont>
     <p:embeddedFont>
       <p:font typeface="Segoe UI" panose="020B0502040204020203" pitchFamily="34" charset="0"/>
-      <p:regular r:id="rId37"/>
-      <p:bold r:id="rId38"/>
-      <p:italic r:id="rId39"/>
-      <p:boldItalic r:id="rId40"/>
+      <p:regular r:id="rId31"/>
+      <p:bold r:id="rId32"/>
+      <p:italic r:id="rId33"/>
+      <p:boldItalic r:id="rId34"/>
+    </p:embeddedFont>
+    <p:embeddedFont>
+      <p:font typeface="Verdana" panose="020B0604030504040204" pitchFamily="34" charset="0"/>
+      <p:regular r:id="rId35"/>
+      <p:bold r:id="rId36"/>
+      <p:italic r:id="rId37"/>
+      <p:boldItalic r:id="rId38"/>
+    </p:embeddedFont>
+    <p:embeddedFont>
+      <p:font typeface="Segoe UI Light" panose="020B0502040204020203" pitchFamily="34" charset="0"/>
+      <p:regular r:id="rId39"/>
+      <p:italic r:id="rId40"/>
     </p:embeddedFont>
   </p:embeddedFontLst>
   <p:defaultTextStyle>
@@ -357,7 +357,7 @@
           <a:p>
             <a:fld id="{7D784404-57E5-4341-9230-5EC072B8C3C5}" type="datetimeFigureOut">
               <a:rPr lang="en-US" smtClean="0"/>
-              <a:t>5/12/2018</a:t>
+              <a:t>5/14/2018</a:t>
             </a:fld>
             <a:endParaRPr lang="en-US"/>
           </a:p>
@@ -534,7 +534,7 @@
           <a:p>
             <a:fld id="{9933EFA3-31EF-403B-8080-9776000D59FF}" type="datetimeFigureOut">
               <a:rPr lang="en-US" smtClean="0"/>
-              <a:t>5/12/2018</a:t>
+              <a:t>5/14/2018</a:t>
             </a:fld>
             <a:endParaRPr lang="en-US" dirty="0"/>
           </a:p>
@@ -7327,6 +7327,153 @@
 
 <file path=ppt/slideLayouts/slideLayout20.xml><?xml version="1.0" encoding="utf-8"?>
 <p:sldLayout xmlns:a="http://schemas.openxmlformats.org/drawingml/2006/main" xmlns:r="http://schemas.openxmlformats.org/officeDocument/2006/relationships" xmlns:p="http://schemas.openxmlformats.org/presentationml/2006/main" preserve="1" userDrawn="1">
+  <p:cSld name="Title &amp; Non-Bulleted Text">
+    <p:spTree>
+      <p:nvGrpSpPr>
+        <p:cNvPr id="1" name=""/>
+        <p:cNvGrpSpPr/>
+        <p:nvPr/>
+      </p:nvGrpSpPr>
+      <p:grpSpPr>
+        <a:xfrm>
+          <a:off x="0" y="0"/>
+          <a:ext cx="0" cy="0"/>
+          <a:chOff x="0" y="0"/>
+          <a:chExt cx="0" cy="0"/>
+        </a:xfrm>
+      </p:grpSpPr>
+      <p:sp>
+        <p:nvSpPr>
+          <p:cNvPr id="2" name="Title 1">
+            <a:extLst>
+              <a:ext uri="{FF2B5EF4-FFF2-40B4-BE49-F238E27FC236}">
+                <a16:creationId xmlns:a16="http://schemas.microsoft.com/office/drawing/2014/main" id="{5E17777A-DEE7-435B-9586-0103DF77F643}"/>
+              </a:ext>
+            </a:extLst>
+          </p:cNvPr>
+          <p:cNvSpPr>
+            <a:spLocks noGrp="1"/>
+          </p:cNvSpPr>
+          <p:nvPr>
+            <p:ph type="title" hasCustomPrompt="1"/>
+          </p:nvPr>
+        </p:nvSpPr>
+        <p:spPr/>
+        <p:txBody>
+          <a:bodyPr/>
+          <a:lstStyle>
+            <a:lvl1pPr>
+              <a:defRPr/>
+            </a:lvl1pPr>
+          </a:lstStyle>
+          <a:p>
+            <a:r>
+              <a:rPr lang="en-US" dirty="0"/>
+              <a:t>Click to edit NON-BULLETED TEXT title style</a:t>
+            </a:r>
+          </a:p>
+        </p:txBody>
+      </p:sp>
+      <p:sp>
+        <p:nvSpPr>
+          <p:cNvPr id="3" name="Text Placeholder 3">
+            <a:extLst>
+              <a:ext uri="{FF2B5EF4-FFF2-40B4-BE49-F238E27FC236}">
+                <a16:creationId xmlns:a16="http://schemas.microsoft.com/office/drawing/2014/main" id="{E2F3D165-3D91-440C-8CC8-1E0E8F3DB5B4}"/>
+              </a:ext>
+            </a:extLst>
+          </p:cNvPr>
+          <p:cNvSpPr>
+            <a:spLocks noGrp="1"/>
+          </p:cNvSpPr>
+          <p:nvPr>
+            <p:ph type="body" sz="quarter" idx="10" hasCustomPrompt="1"/>
+          </p:nvPr>
+        </p:nvSpPr>
+        <p:spPr>
+          <a:xfrm>
+            <a:off x="201930" y="1189177"/>
+            <a:ext cx="8741309" cy="1969770"/>
+          </a:xfrm>
+        </p:spPr>
+        <p:txBody>
+          <a:bodyPr>
+            <a:spAutoFit/>
+          </a:bodyPr>
+          <a:lstStyle>
+            <a:lvl1pPr marL="0" indent="0">
+              <a:buNone/>
+              <a:defRPr/>
+            </a:lvl1pPr>
+            <a:lvl2pPr marL="168073" indent="0">
+              <a:buNone/>
+              <a:defRPr/>
+            </a:lvl2pPr>
+            <a:lvl3pPr marL="336145" indent="0">
+              <a:buNone/>
+              <a:defRPr/>
+            </a:lvl3pPr>
+            <a:lvl4pPr marL="504218" indent="0">
+              <a:buNone/>
+              <a:defRPr/>
+            </a:lvl4pPr>
+            <a:lvl5pPr marL="672290" indent="0">
+              <a:buNone/>
+              <a:defRPr/>
+            </a:lvl5pPr>
+          </a:lstStyle>
+          <a:p>
+            <a:pPr lvl="0"/>
+            <a:r>
+              <a:rPr lang="en-US" dirty="0"/>
+              <a:t>Edit NON-BULLETED TEXT  text styles</a:t>
+            </a:r>
+          </a:p>
+          <a:p>
+            <a:pPr lvl="1"/>
+            <a:r>
+              <a:rPr lang="en-US" dirty="0"/>
+              <a:t>Second level</a:t>
+            </a:r>
+          </a:p>
+          <a:p>
+            <a:pPr lvl="2"/>
+            <a:r>
+              <a:rPr lang="en-US" dirty="0"/>
+              <a:t>Third level</a:t>
+            </a:r>
+          </a:p>
+          <a:p>
+            <a:pPr lvl="3"/>
+            <a:r>
+              <a:rPr lang="en-US" dirty="0"/>
+              <a:t>Fourth level</a:t>
+            </a:r>
+          </a:p>
+          <a:p>
+            <a:pPr lvl="4"/>
+            <a:r>
+              <a:rPr lang="en-US" dirty="0"/>
+              <a:t>Fifth level</a:t>
+            </a:r>
+          </a:p>
+        </p:txBody>
+      </p:sp>
+    </p:spTree>
+    <p:extLst>
+      <p:ext uri="{BB962C8B-B14F-4D97-AF65-F5344CB8AC3E}">
+        <p14:creationId xmlns:p14="http://schemas.microsoft.com/office/powerpoint/2010/main" val="2367559640"/>
+      </p:ext>
+    </p:extLst>
+  </p:cSld>
+  <p:clrMapOvr>
+    <a:masterClrMapping/>
+  </p:clrMapOvr>
+</p:sldLayout>
+</file>
+
+<file path=ppt/slideLayouts/slideLayout21.xml><?xml version="1.0" encoding="utf-8"?>
+<p:sldLayout xmlns:a="http://schemas.openxmlformats.org/drawingml/2006/main" xmlns:r="http://schemas.openxmlformats.org/officeDocument/2006/relationships" xmlns:p="http://schemas.openxmlformats.org/presentationml/2006/main" preserve="1" userDrawn="1">
   <p:cSld name="Blank">
     <p:spTree>
       <p:nvGrpSpPr>
@@ -7415,7 +7562,7 @@
 </p:sldLayout>
 </file>
 
-<file path=ppt/slideLayouts/slideLayout21.xml><?xml version="1.0" encoding="utf-8"?>
+<file path=ppt/slideLayouts/slideLayout22.xml><?xml version="1.0" encoding="utf-8"?>
 <p:sldLayout xmlns:a="http://schemas.openxmlformats.org/drawingml/2006/main" xmlns:r="http://schemas.openxmlformats.org/officeDocument/2006/relationships" xmlns:p="http://schemas.openxmlformats.org/presentationml/2006/main" preserve="1" userDrawn="1">
   <p:cSld name="Content with Caption">
     <p:spTree>
@@ -7831,7 +7978,7 @@
 </p:sldLayout>
 </file>
 
-<file path=ppt/slideLayouts/slideLayout22.xml><?xml version="1.0" encoding="utf-8"?>
+<file path=ppt/slideLayouts/slideLayout23.xml><?xml version="1.0" encoding="utf-8"?>
 <p:sldLayout xmlns:a="http://schemas.openxmlformats.org/drawingml/2006/main" xmlns:r="http://schemas.openxmlformats.org/officeDocument/2006/relationships" xmlns:p="http://schemas.openxmlformats.org/presentationml/2006/main" preserve="1" userDrawn="1">
   <p:cSld name="Picture with Caption">
     <p:spTree>
@@ -8082,7 +8229,7 @@
 </p:sldLayout>
 </file>
 
-<file path=ppt/slideLayouts/slideLayout23.xml><?xml version="1.0" encoding="utf-8"?>
+<file path=ppt/slideLayouts/slideLayout24.xml><?xml version="1.0" encoding="utf-8"?>
 <p:sldLayout xmlns:a="http://schemas.openxmlformats.org/drawingml/2006/main" xmlns:r="http://schemas.openxmlformats.org/officeDocument/2006/relationships" xmlns:p="http://schemas.openxmlformats.org/presentationml/2006/main" type="vertTx" preserve="1">
   <p:cSld name="Title and Vertical Text">
     <p:spTree>
@@ -8186,7 +8333,7 @@
 </p:sldLayout>
 </file>
 
-<file path=ppt/slideLayouts/slideLayout24.xml><?xml version="1.0" encoding="utf-8"?>
+<file path=ppt/slideLayouts/slideLayout25.xml><?xml version="1.0" encoding="utf-8"?>
 <p:sldLayout xmlns:a="http://schemas.openxmlformats.org/drawingml/2006/main" xmlns:r="http://schemas.openxmlformats.org/officeDocument/2006/relationships" xmlns:p="http://schemas.openxmlformats.org/presentationml/2006/main" type="vertTitleAndTx" preserve="1">
   <p:cSld name="Vertical Title and Text">
     <p:spTree>
@@ -8308,7 +8455,7 @@
 </p:sldLayout>
 </file>
 
-<file path=ppt/slideLayouts/slideLayout25.xml><?xml version="1.0" encoding="utf-8"?>
+<file path=ppt/slideLayouts/slideLayout26.xml><?xml version="1.0" encoding="utf-8"?>
 <p:sldLayout xmlns:a="http://schemas.openxmlformats.org/drawingml/2006/main" xmlns:r="http://schemas.openxmlformats.org/officeDocument/2006/relationships" xmlns:p="http://schemas.openxmlformats.org/presentationml/2006/main" preserve="1" userDrawn="1">
   <p:cSld name="Title Solid">
     <p:bg bwMode="auto">
@@ -8641,7 +8788,7 @@
 </p:sldLayout>
 </file>
 
-<file path=ppt/slideLayouts/slideLayout26.xml><?xml version="1.0" encoding="utf-8"?>
+<file path=ppt/slideLayouts/slideLayout27.xml><?xml version="1.0" encoding="utf-8"?>
 <p:sldLayout xmlns:a="http://schemas.openxmlformats.org/drawingml/2006/main" xmlns:r="http://schemas.openxmlformats.org/officeDocument/2006/relationships" xmlns:p="http://schemas.openxmlformats.org/presentationml/2006/main" preserve="1" userDrawn="1">
   <p:cSld name="Title Solid - ANIMATED">
     <p:bg bwMode="auto">
@@ -11536,13 +11683,14 @@
     <p:sldLayoutId id="2147483663" r:id="rId17"/>
     <p:sldLayoutId id="2147483664" r:id="rId18"/>
     <p:sldLayoutId id="2147483665" r:id="rId19"/>
-    <p:sldLayoutId id="2147483667" r:id="rId20"/>
-    <p:sldLayoutId id="2147483668" r:id="rId21"/>
-    <p:sldLayoutId id="2147483669" r:id="rId22"/>
-    <p:sldLayoutId id="2147483670" r:id="rId23"/>
-    <p:sldLayoutId id="2147483671" r:id="rId24"/>
-    <p:sldLayoutId id="2147483713" r:id="rId25"/>
-    <p:sldLayoutId id="2147483714" r:id="rId26"/>
+    <p:sldLayoutId id="2147483715" r:id="rId20"/>
+    <p:sldLayoutId id="2147483667" r:id="rId21"/>
+    <p:sldLayoutId id="2147483668" r:id="rId22"/>
+    <p:sldLayoutId id="2147483669" r:id="rId23"/>
+    <p:sldLayoutId id="2147483670" r:id="rId24"/>
+    <p:sldLayoutId id="2147483671" r:id="rId25"/>
+    <p:sldLayoutId id="2147483713" r:id="rId26"/>
+    <p:sldLayoutId id="2147483714" r:id="rId27"/>
   </p:sldLayoutIdLst>
   <p:txStyles>
     <p:titleStyle>

</xml_diff>